<commit_message>
update presentation.pptx + praesentation.md
</commit_message>
<xml_diff>
--- a/presentation/presentation_main.pptx
+++ b/presentation/presentation_main.pptx
@@ -5,10 +5,10 @@
     <p:sldMasterId id="2147483657" r:id="rId1"/>
   </p:sldMasterIdLst>
   <p:notesMasterIdLst>
-    <p:notesMasterId r:id="rId14"/>
+    <p:notesMasterId r:id="rId16"/>
   </p:notesMasterIdLst>
   <p:handoutMasterIdLst>
-    <p:handoutMasterId r:id="rId15"/>
+    <p:handoutMasterId r:id="rId17"/>
   </p:handoutMasterIdLst>
   <p:sldIdLst>
     <p:sldId id="842" r:id="rId2"/>
@@ -21,8 +21,10 @@
     <p:sldId id="843" r:id="rId9"/>
     <p:sldId id="847" r:id="rId10"/>
     <p:sldId id="846" r:id="rId11"/>
-    <p:sldId id="848" r:id="rId12"/>
-    <p:sldId id="849" r:id="rId13"/>
+    <p:sldId id="850" r:id="rId12"/>
+    <p:sldId id="848" r:id="rId13"/>
+    <p:sldId id="849" r:id="rId14"/>
+    <p:sldId id="851" r:id="rId15"/>
   </p:sldIdLst>
   <p:sldSz cx="12192000" cy="6858000"/>
   <p:notesSz cx="9928225" cy="6797675"/>
@@ -136,14 +138,19 @@
             <p14:sldId id="843"/>
             <p14:sldId id="847"/>
             <p14:sldId id="846"/>
+            <p14:sldId id="850"/>
             <p14:sldId id="848"/>
             <p14:sldId id="849"/>
+            <p14:sldId id="851"/>
           </p14:sldIdLst>
         </p14:section>
       </p14:sectionLst>
     </p:ext>
     <p:ext uri="{EFAFB233-063F-42B5-8137-9DF3F51BA10A}">
       <p15:sldGuideLst xmlns:p15="http://schemas.microsoft.com/office/powerpoint/2012/main"/>
+    </p:ext>
+    <p:ext uri="{2D200454-40CA-4A62-9FC3-DE9A4176ACB9}">
+      <p15:notesGuideLst xmlns:p15="http://schemas.microsoft.com/office/powerpoint/2012/main"/>
     </p:ext>
   </p:extLst>
 </p:presentation>
@@ -231,7 +238,7 @@
           <a:p>
             <a:fld id="{869A1B57-EE7A-4428-9C75-7467DECC123D}" type="datetimeFigureOut">
               <a:rPr lang="de-DE" smtClean="0"/>
-              <a:t>21.09.19</a:t>
+              <a:t>24.09.19</a:t>
             </a:fld>
             <a:endParaRPr lang="de-DE"/>
           </a:p>
@@ -396,7 +403,7 @@
           <a:p>
             <a:fld id="{1D1326B5-246B-428F-87A6-0A6663AEBAA6}" type="datetimeFigureOut">
               <a:rPr lang="de-DE" smtClean="0"/>
-              <a:t>21.09.19</a:t>
+              <a:t>24.09.19</a:t>
             </a:fld>
             <a:endParaRPr lang="de-DE"/>
           </a:p>
@@ -946,7 +953,10 @@
           <a:lstStyle/>
           <a:p>
             <a:pPr eaLnBrk="1" hangingPunct="1"/>
-            <a:endParaRPr lang="de-DE" dirty="0"/>
+            <a:r>
+              <a:rPr lang="de-DE" dirty="0"/>
+              <a:t>Ein bisschen schön labern wie gut wir unsere Probleme gelöst haben</a:t>
+            </a:r>
           </a:p>
         </p:txBody>
       </p:sp>
@@ -1074,7 +1084,7 @@
     </p:spTree>
     <p:extLst>
       <p:ext uri="{BB962C8B-B14F-4D97-AF65-F5344CB8AC3E}">
-        <p14:creationId xmlns:p14="http://schemas.microsoft.com/office/powerpoint/2010/main" val="2654448333"/>
+        <p14:creationId xmlns:p14="http://schemas.microsoft.com/office/powerpoint/2010/main" val="1515511345"/>
       </p:ext>
     </p:extLst>
   </p:cSld>
@@ -1195,7 +1205,249 @@
     </p:spTree>
     <p:extLst>
       <p:ext uri="{BB962C8B-B14F-4D97-AF65-F5344CB8AC3E}">
+        <p14:creationId xmlns:p14="http://schemas.microsoft.com/office/powerpoint/2010/main" val="2654448333"/>
+      </p:ext>
+    </p:extLst>
+  </p:cSld>
+  <p:clrMapOvr>
+    <a:masterClrMapping/>
+  </p:clrMapOvr>
+</p:notes>
+</file>
+
+<file path=ppt/notesSlides/notesSlide13.xml><?xml version="1.0" encoding="utf-8"?>
+<p:notes xmlns:a="http://schemas.openxmlformats.org/drawingml/2006/main" xmlns:r="http://schemas.openxmlformats.org/officeDocument/2006/relationships" xmlns:p="http://schemas.openxmlformats.org/presentationml/2006/main">
+  <p:cSld>
+    <p:spTree>
+      <p:nvGrpSpPr>
+        <p:cNvPr id="1" name=""/>
+        <p:cNvGrpSpPr/>
+        <p:nvPr/>
+      </p:nvGrpSpPr>
+      <p:grpSpPr>
+        <a:xfrm>
+          <a:off x="0" y="0"/>
+          <a:ext cx="0" cy="0"/>
+          <a:chOff x="0" y="0"/>
+          <a:chExt cx="0" cy="0"/>
+        </a:xfrm>
+      </p:grpSpPr>
+      <p:sp>
+        <p:nvSpPr>
+          <p:cNvPr id="32770" name="Rectangle 7"/>
+          <p:cNvSpPr txBox="1">
+            <a:spLocks noGrp="1" noChangeArrowheads="1"/>
+          </p:cNvSpPr>
+          <p:nvPr/>
+        </p:nvSpPr>
+        <p:spPr bwMode="auto">
+          <a:xfrm>
+            <a:off x="5819045" y="7226072"/>
+            <a:ext cx="4456210" cy="381188"/>
+          </a:xfrm>
+          <a:prstGeom prst="rect">
+            <a:avLst/>
+          </a:prstGeom>
+          <a:noFill/>
+          <a:ln w="9525">
+            <a:noFill/>
+            <a:miter lim="800000"/>
+            <a:headEnd/>
+            <a:tailEnd/>
+          </a:ln>
+        </p:spPr>
+        <p:txBody>
+          <a:bodyPr lIns="98795" tIns="49398" rIns="98795" bIns="49398" anchor="b"/>
+          <a:lstStyle/>
+          <a:p>
+            <a:pPr algn="r" defTabSz="988916"/>
+            <a:fld id="{53ED29D5-EFF4-4BAA-A4CB-43691B25D5A5}" type="slidenum">
+              <a:rPr lang="de-DE" sz="1100"/>
+              <a:pPr algn="r" defTabSz="988916"/>
+              <a:t>13</a:t>
+            </a:fld>
+            <a:endParaRPr lang="de-DE" sz="1100" dirty="0"/>
+          </a:p>
+        </p:txBody>
+      </p:sp>
+      <p:sp>
+        <p:nvSpPr>
+          <p:cNvPr id="32771" name="Rectangle 2"/>
+          <p:cNvSpPr>
+            <a:spLocks noGrp="1" noRot="1" noChangeAspect="1" noChangeArrowheads="1" noTextEdit="1"/>
+          </p:cNvSpPr>
+          <p:nvPr>
+            <p:ph type="sldImg"/>
+          </p:nvPr>
+        </p:nvSpPr>
+        <p:spPr bwMode="auto">
+          <a:xfrm>
+            <a:off x="2608263" y="573088"/>
+            <a:ext cx="5064125" cy="2849562"/>
+          </a:xfrm>
+          <a:noFill/>
+          <a:ln>
+            <a:solidFill>
+              <a:srgbClr val="000000"/>
+            </a:solidFill>
+            <a:miter lim="800000"/>
+            <a:headEnd/>
+            <a:tailEnd/>
+          </a:ln>
+        </p:spPr>
+      </p:sp>
+      <p:sp>
+        <p:nvSpPr>
+          <p:cNvPr id="32772" name="Rectangle 3"/>
+          <p:cNvSpPr>
+            <a:spLocks noGrp="1" noChangeArrowheads="1"/>
+          </p:cNvSpPr>
+          <p:nvPr>
+            <p:ph type="body" idx="1"/>
+          </p:nvPr>
+        </p:nvSpPr>
+        <p:spPr>
+          <a:xfrm>
+            <a:off x="1029594" y="3614806"/>
+            <a:ext cx="8220662" cy="3421260"/>
+          </a:xfrm>
+          <a:noFill/>
+          <a:ln/>
+        </p:spPr>
+        <p:txBody>
+          <a:bodyPr lIns="98795" tIns="49398" rIns="98795" bIns="49398"/>
+          <a:lstStyle/>
+          <a:p>
+            <a:pPr eaLnBrk="1" hangingPunct="1"/>
+            <a:endParaRPr lang="de-DE" dirty="0"/>
+          </a:p>
+        </p:txBody>
+      </p:sp>
+    </p:spTree>
+    <p:extLst>
+      <p:ext uri="{BB962C8B-B14F-4D97-AF65-F5344CB8AC3E}">
         <p14:creationId xmlns:p14="http://schemas.microsoft.com/office/powerpoint/2010/main" val="469552013"/>
+      </p:ext>
+    </p:extLst>
+  </p:cSld>
+  <p:clrMapOvr>
+    <a:masterClrMapping/>
+  </p:clrMapOvr>
+</p:notes>
+</file>
+
+<file path=ppt/notesSlides/notesSlide14.xml><?xml version="1.0" encoding="utf-8"?>
+<p:notes xmlns:a="http://schemas.openxmlformats.org/drawingml/2006/main" xmlns:r="http://schemas.openxmlformats.org/officeDocument/2006/relationships" xmlns:p="http://schemas.openxmlformats.org/presentationml/2006/main">
+  <p:cSld>
+    <p:spTree>
+      <p:nvGrpSpPr>
+        <p:cNvPr id="1" name=""/>
+        <p:cNvGrpSpPr/>
+        <p:nvPr/>
+      </p:nvGrpSpPr>
+      <p:grpSpPr>
+        <a:xfrm>
+          <a:off x="0" y="0"/>
+          <a:ext cx="0" cy="0"/>
+          <a:chOff x="0" y="0"/>
+          <a:chExt cx="0" cy="0"/>
+        </a:xfrm>
+      </p:grpSpPr>
+      <p:sp>
+        <p:nvSpPr>
+          <p:cNvPr id="32770" name="Rectangle 7"/>
+          <p:cNvSpPr txBox="1">
+            <a:spLocks noGrp="1" noChangeArrowheads="1"/>
+          </p:cNvSpPr>
+          <p:nvPr/>
+        </p:nvSpPr>
+        <p:spPr bwMode="auto">
+          <a:xfrm>
+            <a:off x="5819045" y="7226072"/>
+            <a:ext cx="4456210" cy="381188"/>
+          </a:xfrm>
+          <a:prstGeom prst="rect">
+            <a:avLst/>
+          </a:prstGeom>
+          <a:noFill/>
+          <a:ln w="9525">
+            <a:noFill/>
+            <a:miter lim="800000"/>
+            <a:headEnd/>
+            <a:tailEnd/>
+          </a:ln>
+        </p:spPr>
+        <p:txBody>
+          <a:bodyPr lIns="98795" tIns="49398" rIns="98795" bIns="49398" anchor="b"/>
+          <a:lstStyle/>
+          <a:p>
+            <a:pPr algn="r" defTabSz="988916"/>
+            <a:fld id="{53ED29D5-EFF4-4BAA-A4CB-43691B25D5A5}" type="slidenum">
+              <a:rPr lang="de-DE" sz="1100"/>
+              <a:pPr algn="r" defTabSz="988916"/>
+              <a:t>14</a:t>
+            </a:fld>
+            <a:endParaRPr lang="de-DE" sz="1100" dirty="0"/>
+          </a:p>
+        </p:txBody>
+      </p:sp>
+      <p:sp>
+        <p:nvSpPr>
+          <p:cNvPr id="32771" name="Rectangle 2"/>
+          <p:cNvSpPr>
+            <a:spLocks noGrp="1" noRot="1" noChangeAspect="1" noChangeArrowheads="1" noTextEdit="1"/>
+          </p:cNvSpPr>
+          <p:nvPr>
+            <p:ph type="sldImg"/>
+          </p:nvPr>
+        </p:nvSpPr>
+        <p:spPr bwMode="auto">
+          <a:xfrm>
+            <a:off x="2608263" y="573088"/>
+            <a:ext cx="5064125" cy="2849562"/>
+          </a:xfrm>
+          <a:noFill/>
+          <a:ln>
+            <a:solidFill>
+              <a:srgbClr val="000000"/>
+            </a:solidFill>
+            <a:miter lim="800000"/>
+            <a:headEnd/>
+            <a:tailEnd/>
+          </a:ln>
+        </p:spPr>
+      </p:sp>
+      <p:sp>
+        <p:nvSpPr>
+          <p:cNvPr id="32772" name="Rectangle 3"/>
+          <p:cNvSpPr>
+            <a:spLocks noGrp="1" noChangeArrowheads="1"/>
+          </p:cNvSpPr>
+          <p:nvPr>
+            <p:ph type="body" idx="1"/>
+          </p:nvPr>
+        </p:nvSpPr>
+        <p:spPr>
+          <a:xfrm>
+            <a:off x="1029594" y="3614806"/>
+            <a:ext cx="8220662" cy="3421260"/>
+          </a:xfrm>
+          <a:noFill/>
+          <a:ln/>
+        </p:spPr>
+        <p:txBody>
+          <a:bodyPr lIns="98795" tIns="49398" rIns="98795" bIns="49398"/>
+          <a:lstStyle/>
+          <a:p>
+            <a:pPr eaLnBrk="1" hangingPunct="1"/>
+            <a:endParaRPr lang="de-DE" dirty="0"/>
+          </a:p>
+        </p:txBody>
+      </p:sp>
+    </p:spTree>
+    <p:extLst>
+      <p:ext uri="{BB962C8B-B14F-4D97-AF65-F5344CB8AC3E}">
+        <p14:creationId xmlns:p14="http://schemas.microsoft.com/office/powerpoint/2010/main" val="1933164556"/>
       </p:ext>
     </p:extLst>
   </p:cSld>
@@ -5813,7 +6065,7 @@
         <p:spPr>
           <a:xfrm>
             <a:off x="762795" y="2160000"/>
-            <a:ext cx="10666410" cy="1141274"/>
+            <a:ext cx="10666410" cy="3911264"/>
           </a:xfrm>
           <a:prstGeom prst="rect">
             <a:avLst/>
@@ -5841,19 +6093,17 @@
                 <a:ea typeface="Noto Sans" panose="020B0502040504020204" pitchFamily="34" charset="0"/>
                 <a:cs typeface="Noto Sans" panose="020B0502040504020204" pitchFamily="34" charset="0"/>
               </a:rPr>
-              <a:t>Entstand aus dem Problem von „Tool </a:t>
-            </a:r>
-            <a:r>
-              <a:rPr lang="de-DE" sz="2400" dirty="0" err="1">
-                <a:solidFill>
-                  <a:srgbClr val="1B5A85"/>
-                </a:solidFill>
-                <a:latin typeface="Noto Sans" panose="020B0502040504020204" pitchFamily="34" charset="0"/>
-                <a:ea typeface="Noto Sans" panose="020B0502040504020204" pitchFamily="34" charset="0"/>
-                <a:cs typeface="Noto Sans" panose="020B0502040504020204" pitchFamily="34" charset="0"/>
-              </a:rPr>
-              <a:t>mess</a:t>
-            </a:r>
+              <a:t>Zeit</a:t>
+            </a:r>
+          </a:p>
+          <a:p>
+            <a:pPr marL="800100" lvl="1" indent="-342900">
+              <a:lnSpc>
+                <a:spcPct val="150000"/>
+              </a:lnSpc>
+              <a:buFont typeface="Systemschrift"/>
+              <a:buChar char="+"/>
+            </a:pPr>
             <a:r>
               <a:rPr lang="de-DE" sz="2400" dirty="0">
                 <a:solidFill>
@@ -5863,11 +6113,11 @@
                 <a:ea typeface="Noto Sans" panose="020B0502040504020204" pitchFamily="34" charset="0"/>
                 <a:cs typeface="Noto Sans" panose="020B0502040504020204" pitchFamily="34" charset="0"/>
               </a:rPr>
-              <a:t>“</a:t>
-            </a:r>
-          </a:p>
-          <a:p>
-            <a:pPr marL="342900" indent="-342900">
+              <a:t>Problem: Zeitmangel durch Prüfungen, Urlaub, Praxisaufgaben</a:t>
+            </a:r>
+          </a:p>
+          <a:p>
+            <a:pPr marL="800100" lvl="1" indent="-342900">
               <a:lnSpc>
                 <a:spcPct val="150000"/>
               </a:lnSpc>
@@ -5883,7 +6133,67 @@
                 <a:ea typeface="Noto Sans" panose="020B0502040504020204" pitchFamily="34" charset="0"/>
                 <a:cs typeface="Noto Sans" panose="020B0502040504020204" pitchFamily="34" charset="0"/>
               </a:rPr>
-              <a:t>Werkzeug-Organisation für Unternehmen</a:t>
+              <a:t>Lösung: Aufgabenverteilung möglichst Unabhängig gestalten</a:t>
+            </a:r>
+          </a:p>
+          <a:p>
+            <a:pPr marL="342900" indent="-342900">
+              <a:lnSpc>
+                <a:spcPct val="150000"/>
+              </a:lnSpc>
+              <a:buFont typeface="Systemschrift"/>
+              <a:buChar char="+"/>
+            </a:pPr>
+            <a:r>
+              <a:rPr lang="de-DE" sz="2400" dirty="0">
+                <a:solidFill>
+                  <a:srgbClr val="1B5A85"/>
+                </a:solidFill>
+                <a:latin typeface="Noto Sans" panose="020B0502040504020204" pitchFamily="34" charset="0"/>
+                <a:ea typeface="Noto Sans" panose="020B0502040504020204" pitchFamily="34" charset="0"/>
+                <a:cs typeface="Noto Sans" panose="020B0502040504020204" pitchFamily="34" charset="0"/>
+              </a:rPr>
+              <a:t>Absprachen</a:t>
+            </a:r>
+          </a:p>
+          <a:p>
+            <a:pPr marL="800100" lvl="1" indent="-342900">
+              <a:lnSpc>
+                <a:spcPct val="150000"/>
+              </a:lnSpc>
+              <a:buFont typeface="Systemschrift"/>
+              <a:buChar char="+"/>
+            </a:pPr>
+            <a:r>
+              <a:rPr lang="de-DE" sz="2400" dirty="0">
+                <a:solidFill>
+                  <a:srgbClr val="1B5A85"/>
+                </a:solidFill>
+                <a:latin typeface="Noto Sans" panose="020B0502040504020204" pitchFamily="34" charset="0"/>
+                <a:ea typeface="Noto Sans" panose="020B0502040504020204" pitchFamily="34" charset="0"/>
+                <a:cs typeface="Noto Sans" panose="020B0502040504020204" pitchFamily="34" charset="0"/>
+              </a:rPr>
+              <a:t>Problem: schwierige Absprache durch Urlaube und Aufenthalt in verschiedenen Städten</a:t>
+            </a:r>
+          </a:p>
+          <a:p>
+            <a:pPr marL="800100" lvl="1" indent="-342900">
+              <a:lnSpc>
+                <a:spcPct val="150000"/>
+              </a:lnSpc>
+              <a:buFont typeface="Systemschrift"/>
+              <a:buChar char="+"/>
+            </a:pPr>
+            <a:r>
+              <a:rPr lang="de-DE" sz="2400" dirty="0">
+                <a:solidFill>
+                  <a:srgbClr val="1B5A85"/>
+                </a:solidFill>
+                <a:latin typeface="Noto Sans" panose="020B0502040504020204" pitchFamily="34" charset="0"/>
+                <a:ea typeface="Noto Sans" panose="020B0502040504020204" pitchFamily="34" charset="0"/>
+                <a:cs typeface="Noto Sans" panose="020B0502040504020204" pitchFamily="34" charset="0"/>
+              </a:rPr>
+              <a:t>Lösung: Nutzung von Skype</a:t>
             </a:r>
           </a:p>
         </p:txBody>
@@ -6105,7 +6415,7 @@
                 <a:ea typeface="Noto Sans" panose="020B0502040504020204" pitchFamily="34" charset="0"/>
                 <a:cs typeface="Noto Sans" panose="020B0502040504020204" pitchFamily="34" charset="0"/>
               </a:rPr>
-              <a:t>Jonas’ Part</a:t>
+              <a:t>Probleme und Lösungen</a:t>
             </a:r>
           </a:p>
         </p:txBody>
@@ -6125,7 +6435,7 @@
         <p:spPr>
           <a:xfrm>
             <a:off x="762795" y="2160000"/>
-            <a:ext cx="10666410" cy="3357266"/>
+            <a:ext cx="10666410" cy="2803268"/>
           </a:xfrm>
           <a:prstGeom prst="rect">
             <a:avLst/>
@@ -6153,7 +6463,7 @@
                 <a:ea typeface="Noto Sans" panose="020B0502040504020204" pitchFamily="34" charset="0"/>
                 <a:cs typeface="Noto Sans" panose="020B0502040504020204" pitchFamily="34" charset="0"/>
               </a:rPr>
-              <a:t>Frontend</a:t>
+              <a:t>Arbeit im Team</a:t>
             </a:r>
           </a:p>
           <a:p>
@@ -6173,8 +6483,27 @@
                 <a:ea typeface="Noto Sans" panose="020B0502040504020204" pitchFamily="34" charset="0"/>
                 <a:cs typeface="Noto Sans" panose="020B0502040504020204" pitchFamily="34" charset="0"/>
               </a:rPr>
-              <a:t>CSS und JS</a:t>
-            </a:r>
+              <a:t>Aufgabenverteilung =&gt; </a:t>
+            </a:r>
+            <a:r>
+              <a:rPr lang="de-DE" sz="2400" dirty="0" err="1">
+                <a:solidFill>
+                  <a:srgbClr val="1B5A85"/>
+                </a:solidFill>
+                <a:latin typeface="Noto Sans" panose="020B0502040504020204" pitchFamily="34" charset="0"/>
+                <a:ea typeface="Noto Sans" panose="020B0502040504020204" pitchFamily="34" charset="0"/>
+                <a:cs typeface="Noto Sans" panose="020B0502040504020204" pitchFamily="34" charset="0"/>
+              </a:rPr>
+              <a:t>Projektmanagment</a:t>
+            </a:r>
+            <a:endParaRPr lang="de-DE" sz="2400" dirty="0">
+              <a:solidFill>
+                <a:srgbClr val="1B5A85"/>
+              </a:solidFill>
+              <a:latin typeface="Noto Sans" panose="020B0502040504020204" pitchFamily="34" charset="0"/>
+              <a:ea typeface="Noto Sans" panose="020B0502040504020204" pitchFamily="34" charset="0"/>
+              <a:cs typeface="Noto Sans" panose="020B0502040504020204" pitchFamily="34" charset="0"/>
+            </a:endParaRPr>
           </a:p>
           <a:p>
             <a:pPr marL="342900" indent="-342900">
@@ -6193,11 +6522,11 @@
                 <a:ea typeface="Noto Sans" panose="020B0502040504020204" pitchFamily="34" charset="0"/>
                 <a:cs typeface="Noto Sans" panose="020B0502040504020204" pitchFamily="34" charset="0"/>
               </a:rPr>
-              <a:t>Google SSO</a:t>
-            </a:r>
-          </a:p>
-          <a:p>
-            <a:pPr marL="342900" indent="-342900">
+              <a:t>Soziales</a:t>
+            </a:r>
+          </a:p>
+          <a:p>
+            <a:pPr marL="800100" lvl="1" indent="-342900">
               <a:lnSpc>
                 <a:spcPct val="150000"/>
               </a:lnSpc>
@@ -6213,11 +6542,11 @@
                 <a:ea typeface="Noto Sans" panose="020B0502040504020204" pitchFamily="34" charset="0"/>
                 <a:cs typeface="Noto Sans" panose="020B0502040504020204" pitchFamily="34" charset="0"/>
               </a:rPr>
-              <a:t>Blackbox-Tests</a:t>
-            </a:r>
-          </a:p>
-          <a:p>
-            <a:pPr marL="342900" indent="-342900">
+              <a:t>Problem: kleine Streitigkeiten</a:t>
+            </a:r>
+          </a:p>
+          <a:p>
+            <a:pPr marL="800100" lvl="1" indent="-342900">
               <a:lnSpc>
                 <a:spcPct val="150000"/>
               </a:lnSpc>
@@ -6233,19 +6562,10 @@
                 <a:ea typeface="Noto Sans" panose="020B0502040504020204" pitchFamily="34" charset="0"/>
                 <a:cs typeface="Noto Sans" panose="020B0502040504020204" pitchFamily="34" charset="0"/>
               </a:rPr>
-              <a:t>Erweiterung um kleinere Features</a:t>
-            </a:r>
-          </a:p>
-          <a:p>
-            <a:pPr marL="342900" indent="-342900">
-              <a:lnSpc>
-                <a:spcPct val="150000"/>
-              </a:lnSpc>
-              <a:buFont typeface="Systemschrift"/>
-              <a:buChar char="+"/>
-            </a:pPr>
-            <a:r>
-              <a:rPr lang="de-DE" sz="2400" dirty="0">
+              <a:t>Lösung: </a:t>
+            </a:r>
+            <a:r>
+              <a:rPr lang="de-DE" sz="2400" dirty="0" err="1">
                 <a:solidFill>
                   <a:srgbClr val="1B5A85"/>
                 </a:solidFill>
@@ -6253,18 +6573,7 @@
                 <a:ea typeface="Noto Sans" panose="020B0502040504020204" pitchFamily="34" charset="0"/>
                 <a:cs typeface="Noto Sans" panose="020B0502040504020204" pitchFamily="34" charset="0"/>
               </a:rPr>
-              <a:t>Dokumentation </a:t>
-            </a:r>
-            <a:r>
-              <a:rPr lang="de-DE" sz="2400">
-                <a:solidFill>
-                  <a:srgbClr val="1B5A85"/>
-                </a:solidFill>
-                <a:latin typeface="Noto Sans" panose="020B0502040504020204" pitchFamily="34" charset="0"/>
-                <a:ea typeface="Noto Sans" panose="020B0502040504020204" pitchFamily="34" charset="0"/>
-                <a:cs typeface="Noto Sans" panose="020B0502040504020204" pitchFamily="34" charset="0"/>
-              </a:rPr>
-              <a:t>gegenlesen </a:t>
+              <a:t>Konfliktmanagment</a:t>
             </a:r>
             <a:endParaRPr lang="de-DE" sz="2400" dirty="0">
               <a:solidFill>
@@ -6282,7 +6591,7 @@
           <p:cNvPr id="2" name="Foliennummernplatzhalter 1">
             <a:extLst>
               <a:ext uri="{FF2B5EF4-FFF2-40B4-BE49-F238E27FC236}">
-                <a16:creationId xmlns:a16="http://schemas.microsoft.com/office/drawing/2014/main" id="{8ACC2FE0-83B0-1349-B0B0-EF5A7186D89F}"/>
+                <a16:creationId xmlns:a16="http://schemas.microsoft.com/office/drawing/2014/main" id="{22A936E0-148B-B84A-8362-CD68180C9581}"/>
               </a:ext>
             </a:extLst>
           </p:cNvPr>
@@ -6293,12 +6602,7 @@
             <p:ph type="sldNum" sz="quarter" idx="12"/>
           </p:nvPr>
         </p:nvSpPr>
-        <p:spPr>
-          <a:xfrm>
-            <a:off x="8610600" y="6356350"/>
-            <a:ext cx="2743200" cy="365125"/>
-          </a:xfrm>
-        </p:spPr>
+        <p:spPr/>
         <p:txBody>
           <a:bodyPr/>
           <a:lstStyle/>
@@ -6307,7 +6611,7 @@
               <a:rPr lang="de-DE" smtClean="0"/>
               <a:t>11</a:t>
             </a:fld>
-            <a:endParaRPr lang="de-DE" dirty="0"/>
+            <a:endParaRPr lang="de-DE"/>
           </a:p>
         </p:txBody>
       </p:sp>
@@ -6316,7 +6620,7 @@
           <p:cNvPr id="4" name="Datumsplatzhalter 3">
             <a:extLst>
               <a:ext uri="{FF2B5EF4-FFF2-40B4-BE49-F238E27FC236}">
-                <a16:creationId xmlns:a16="http://schemas.microsoft.com/office/drawing/2014/main" id="{4499A75F-1A94-CF4F-96D6-3196B06E39CE}"/>
+                <a16:creationId xmlns:a16="http://schemas.microsoft.com/office/drawing/2014/main" id="{0F5D43F8-4658-6C46-825B-CF55D0C3B504}"/>
               </a:ext>
             </a:extLst>
           </p:cNvPr>
@@ -6342,7 +6646,7 @@
     </p:spTree>
     <p:extLst>
       <p:ext uri="{BB962C8B-B14F-4D97-AF65-F5344CB8AC3E}">
-        <p14:creationId xmlns:p14="http://schemas.microsoft.com/office/powerpoint/2010/main" val="1591497426"/>
+        <p14:creationId xmlns:p14="http://schemas.microsoft.com/office/powerpoint/2010/main" val="1694307508"/>
       </p:ext>
     </p:extLst>
   </p:cSld>
@@ -6499,7 +6803,7 @@
                 <a:ea typeface="Noto Sans" panose="020B0502040504020204" pitchFamily="34" charset="0"/>
                 <a:cs typeface="Noto Sans" panose="020B0502040504020204" pitchFamily="34" charset="0"/>
               </a:rPr>
-              <a:t>Sebastians Part</a:t>
+              <a:t>Jonas’ Part</a:t>
             </a:r>
           </a:p>
         </p:txBody>
@@ -6519,7 +6823,382 @@
         <p:spPr>
           <a:xfrm>
             <a:off x="762795" y="2160000"/>
-            <a:ext cx="10666410" cy="5573257"/>
+            <a:ext cx="10666410" cy="3357266"/>
+          </a:xfrm>
+          <a:prstGeom prst="rect">
+            <a:avLst/>
+          </a:prstGeom>
+        </p:spPr>
+        <p:txBody>
+          <a:bodyPr wrap="square">
+            <a:spAutoFit/>
+          </a:bodyPr>
+          <a:lstStyle/>
+          <a:p>
+            <a:pPr marL="342900" indent="-342900">
+              <a:lnSpc>
+                <a:spcPct val="150000"/>
+              </a:lnSpc>
+              <a:buFont typeface="Systemschrift"/>
+              <a:buChar char="+"/>
+            </a:pPr>
+            <a:r>
+              <a:rPr lang="de-DE" sz="2400" dirty="0">
+                <a:solidFill>
+                  <a:srgbClr val="1B5A85"/>
+                </a:solidFill>
+                <a:latin typeface="Noto Sans" panose="020B0502040504020204" pitchFamily="34" charset="0"/>
+                <a:ea typeface="Noto Sans" panose="020B0502040504020204" pitchFamily="34" charset="0"/>
+                <a:cs typeface="Noto Sans" panose="020B0502040504020204" pitchFamily="34" charset="0"/>
+              </a:rPr>
+              <a:t>Frontend</a:t>
+            </a:r>
+          </a:p>
+          <a:p>
+            <a:pPr marL="800100" lvl="1" indent="-342900">
+              <a:lnSpc>
+                <a:spcPct val="150000"/>
+              </a:lnSpc>
+              <a:buFont typeface="Systemschrift"/>
+              <a:buChar char="+"/>
+            </a:pPr>
+            <a:r>
+              <a:rPr lang="de-DE" sz="2400" dirty="0">
+                <a:solidFill>
+                  <a:srgbClr val="1B5A85"/>
+                </a:solidFill>
+                <a:latin typeface="Noto Sans" panose="020B0502040504020204" pitchFamily="34" charset="0"/>
+                <a:ea typeface="Noto Sans" panose="020B0502040504020204" pitchFamily="34" charset="0"/>
+                <a:cs typeface="Noto Sans" panose="020B0502040504020204" pitchFamily="34" charset="0"/>
+              </a:rPr>
+              <a:t>CSS und JS</a:t>
+            </a:r>
+          </a:p>
+          <a:p>
+            <a:pPr marL="342900" indent="-342900">
+              <a:lnSpc>
+                <a:spcPct val="150000"/>
+              </a:lnSpc>
+              <a:buFont typeface="Systemschrift"/>
+              <a:buChar char="+"/>
+            </a:pPr>
+            <a:r>
+              <a:rPr lang="de-DE" sz="2400" dirty="0">
+                <a:solidFill>
+                  <a:srgbClr val="1B5A85"/>
+                </a:solidFill>
+                <a:latin typeface="Noto Sans" panose="020B0502040504020204" pitchFamily="34" charset="0"/>
+                <a:ea typeface="Noto Sans" panose="020B0502040504020204" pitchFamily="34" charset="0"/>
+                <a:cs typeface="Noto Sans" panose="020B0502040504020204" pitchFamily="34" charset="0"/>
+              </a:rPr>
+              <a:t>Google SSO</a:t>
+            </a:r>
+          </a:p>
+          <a:p>
+            <a:pPr marL="342900" indent="-342900">
+              <a:lnSpc>
+                <a:spcPct val="150000"/>
+              </a:lnSpc>
+              <a:buFont typeface="Systemschrift"/>
+              <a:buChar char="+"/>
+            </a:pPr>
+            <a:r>
+              <a:rPr lang="de-DE" sz="2400" dirty="0">
+                <a:solidFill>
+                  <a:srgbClr val="1B5A85"/>
+                </a:solidFill>
+                <a:latin typeface="Noto Sans" panose="020B0502040504020204" pitchFamily="34" charset="0"/>
+                <a:ea typeface="Noto Sans" panose="020B0502040504020204" pitchFamily="34" charset="0"/>
+                <a:cs typeface="Noto Sans" panose="020B0502040504020204" pitchFamily="34" charset="0"/>
+              </a:rPr>
+              <a:t>Blackbox-Tests</a:t>
+            </a:r>
+          </a:p>
+          <a:p>
+            <a:pPr marL="342900" indent="-342900">
+              <a:lnSpc>
+                <a:spcPct val="150000"/>
+              </a:lnSpc>
+              <a:buFont typeface="Systemschrift"/>
+              <a:buChar char="+"/>
+            </a:pPr>
+            <a:r>
+              <a:rPr lang="de-DE" sz="2400" dirty="0">
+                <a:solidFill>
+                  <a:srgbClr val="1B5A85"/>
+                </a:solidFill>
+                <a:latin typeface="Noto Sans" panose="020B0502040504020204" pitchFamily="34" charset="0"/>
+                <a:ea typeface="Noto Sans" panose="020B0502040504020204" pitchFamily="34" charset="0"/>
+                <a:cs typeface="Noto Sans" panose="020B0502040504020204" pitchFamily="34" charset="0"/>
+              </a:rPr>
+              <a:t>Erweiterung um kleinere Features</a:t>
+            </a:r>
+          </a:p>
+          <a:p>
+            <a:pPr marL="342900" indent="-342900">
+              <a:lnSpc>
+                <a:spcPct val="150000"/>
+              </a:lnSpc>
+              <a:buFont typeface="Systemschrift"/>
+              <a:buChar char="+"/>
+            </a:pPr>
+            <a:r>
+              <a:rPr lang="de-DE" sz="2400" dirty="0">
+                <a:solidFill>
+                  <a:srgbClr val="1B5A85"/>
+                </a:solidFill>
+                <a:latin typeface="Noto Sans" panose="020B0502040504020204" pitchFamily="34" charset="0"/>
+                <a:ea typeface="Noto Sans" panose="020B0502040504020204" pitchFamily="34" charset="0"/>
+                <a:cs typeface="Noto Sans" panose="020B0502040504020204" pitchFamily="34" charset="0"/>
+              </a:rPr>
+              <a:t>Dokumentation gegenlesen </a:t>
+            </a:r>
+          </a:p>
+        </p:txBody>
+      </p:sp>
+      <p:sp>
+        <p:nvSpPr>
+          <p:cNvPr id="2" name="Foliennummernplatzhalter 1">
+            <a:extLst>
+              <a:ext uri="{FF2B5EF4-FFF2-40B4-BE49-F238E27FC236}">
+                <a16:creationId xmlns:a16="http://schemas.microsoft.com/office/drawing/2014/main" id="{8ACC2FE0-83B0-1349-B0B0-EF5A7186D89F}"/>
+              </a:ext>
+            </a:extLst>
+          </p:cNvPr>
+          <p:cNvSpPr>
+            <a:spLocks noGrp="1"/>
+          </p:cNvSpPr>
+          <p:nvPr>
+            <p:ph type="sldNum" sz="quarter" idx="12"/>
+          </p:nvPr>
+        </p:nvSpPr>
+        <p:spPr>
+          <a:xfrm>
+            <a:off x="8610600" y="6356350"/>
+            <a:ext cx="2743200" cy="365125"/>
+          </a:xfrm>
+        </p:spPr>
+        <p:txBody>
+          <a:bodyPr/>
+          <a:lstStyle/>
+          <a:p>
+            <a:fld id="{12DF98A7-AE68-F146-B173-80A378F4652F}" type="slidenum">
+              <a:rPr lang="de-DE" smtClean="0"/>
+              <a:t>12</a:t>
+            </a:fld>
+            <a:endParaRPr lang="de-DE" dirty="0"/>
+          </a:p>
+        </p:txBody>
+      </p:sp>
+      <p:sp>
+        <p:nvSpPr>
+          <p:cNvPr id="4" name="Datumsplatzhalter 3">
+            <a:extLst>
+              <a:ext uri="{FF2B5EF4-FFF2-40B4-BE49-F238E27FC236}">
+                <a16:creationId xmlns:a16="http://schemas.microsoft.com/office/drawing/2014/main" id="{4499A75F-1A94-CF4F-96D6-3196B06E39CE}"/>
+              </a:ext>
+            </a:extLst>
+          </p:cNvPr>
+          <p:cNvSpPr>
+            <a:spLocks noGrp="1"/>
+          </p:cNvSpPr>
+          <p:nvPr>
+            <p:ph type="dt" sz="half" idx="10"/>
+          </p:nvPr>
+        </p:nvSpPr>
+        <p:spPr/>
+        <p:txBody>
+          <a:bodyPr/>
+          <a:lstStyle/>
+          <a:p>
+            <a:r>
+              <a:rPr lang="de-DE"/>
+              <a:t>01.10.2019</a:t>
+            </a:r>
+          </a:p>
+        </p:txBody>
+      </p:sp>
+    </p:spTree>
+    <p:extLst>
+      <p:ext uri="{BB962C8B-B14F-4D97-AF65-F5344CB8AC3E}">
+        <p14:creationId xmlns:p14="http://schemas.microsoft.com/office/powerpoint/2010/main" val="1591497426"/>
+      </p:ext>
+    </p:extLst>
+  </p:cSld>
+  <p:clrMapOvr>
+    <a:masterClrMapping/>
+  </p:clrMapOvr>
+  <p:timing>
+    <p:tnLst>
+      <p:par>
+        <p:cTn id="1" dur="indefinite" restart="never" nodeType="tmRoot">
+          <p:childTnLst>
+            <p:seq concurrent="1" nextAc="seek">
+              <p:cTn id="2" dur="indefinite" nodeType="mainSeq">
+                <p:childTnLst>
+                  <p:par>
+                    <p:cTn id="3" fill="hold">
+                      <p:stCondLst>
+                        <p:cond delay="indefinite"/>
+                      </p:stCondLst>
+                      <p:childTnLst>
+                        <p:par>
+                          <p:cTn id="4" fill="hold">
+                            <p:stCondLst>
+                              <p:cond delay="0"/>
+                            </p:stCondLst>
+                            <p:childTnLst>
+                              <p:par>
+                                <p:cTn id="5" presetID="10" presetClass="entr" presetSubtype="0" fill="hold" grpId="0" nodeType="clickEffect">
+                                  <p:stCondLst>
+                                    <p:cond delay="0"/>
+                                  </p:stCondLst>
+                                  <p:childTnLst>
+                                    <p:set>
+                                      <p:cBhvr>
+                                        <p:cTn id="6" dur="1" fill="hold">
+                                          <p:stCondLst>
+                                            <p:cond delay="0"/>
+                                          </p:stCondLst>
+                                        </p:cTn>
+                                        <p:tgtEl>
+                                          <p:spTgt spid="3"/>
+                                        </p:tgtEl>
+                                        <p:attrNameLst>
+                                          <p:attrName>style.visibility</p:attrName>
+                                        </p:attrNameLst>
+                                      </p:cBhvr>
+                                      <p:to>
+                                        <p:strVal val="visible"/>
+                                      </p:to>
+                                    </p:set>
+                                    <p:animEffect transition="in" filter="fade">
+                                      <p:cBhvr>
+                                        <p:cTn id="7" dur="100"/>
+                                        <p:tgtEl>
+                                          <p:spTgt spid="3"/>
+                                        </p:tgtEl>
+                                      </p:cBhvr>
+                                    </p:animEffect>
+                                  </p:childTnLst>
+                                </p:cTn>
+                              </p:par>
+                            </p:childTnLst>
+                          </p:cTn>
+                        </p:par>
+                      </p:childTnLst>
+                    </p:cTn>
+                  </p:par>
+                </p:childTnLst>
+              </p:cTn>
+              <p:prevCondLst>
+                <p:cond evt="onPrev" delay="0">
+                  <p:tgtEl>
+                    <p:sldTgt/>
+                  </p:tgtEl>
+                </p:cond>
+              </p:prevCondLst>
+              <p:nextCondLst>
+                <p:cond evt="onNext" delay="0">
+                  <p:tgtEl>
+                    <p:sldTgt/>
+                  </p:tgtEl>
+                </p:cond>
+              </p:nextCondLst>
+            </p:seq>
+          </p:childTnLst>
+        </p:cTn>
+      </p:par>
+    </p:tnLst>
+    <p:bldLst>
+      <p:bldP spid="3" grpId="0"/>
+    </p:bldLst>
+  </p:timing>
+</p:sld>
+</file>
+
+<file path=ppt/slides/slide13.xml><?xml version="1.0" encoding="utf-8"?>
+<p:sld xmlns:a="http://schemas.openxmlformats.org/drawingml/2006/main" xmlns:r="http://schemas.openxmlformats.org/officeDocument/2006/relationships" xmlns:p="http://schemas.openxmlformats.org/presentationml/2006/main">
+  <p:cSld>
+    <p:spTree>
+      <p:nvGrpSpPr>
+        <p:cNvPr id="1" name=""/>
+        <p:cNvGrpSpPr/>
+        <p:nvPr/>
+      </p:nvGrpSpPr>
+      <p:grpSpPr>
+        <a:xfrm>
+          <a:off x="0" y="0"/>
+          <a:ext cx="0" cy="0"/>
+          <a:chOff x="0" y="0"/>
+          <a:chExt cx="0" cy="0"/>
+        </a:xfrm>
+      </p:grpSpPr>
+      <p:sp>
+        <p:nvSpPr>
+          <p:cNvPr id="6" name="Rectangle 6"/>
+          <p:cNvSpPr>
+            <a:spLocks noChangeArrowheads="1"/>
+          </p:cNvSpPr>
+          <p:nvPr/>
+        </p:nvSpPr>
+        <p:spPr bwMode="auto">
+          <a:xfrm>
+            <a:off x="1798820" y="278267"/>
+            <a:ext cx="10393180" cy="1566862"/>
+          </a:xfrm>
+          <a:prstGeom prst="rect">
+            <a:avLst/>
+          </a:prstGeom>
+          <a:noFill/>
+          <a:ln w="9525">
+            <a:noFill/>
+            <a:miter lim="800000"/>
+            <a:headEnd/>
+            <a:tailEnd/>
+          </a:ln>
+        </p:spPr>
+        <p:txBody>
+          <a:bodyPr rIns="1080000" anchor="b">
+            <a:noAutofit/>
+          </a:bodyPr>
+          <a:lstStyle/>
+          <a:p>
+            <a:pPr>
+              <a:lnSpc>
+                <a:spcPct val="75000"/>
+              </a:lnSpc>
+            </a:pPr>
+            <a:r>
+              <a:rPr lang="de-DE" sz="4000" spc="-150" dirty="0">
+                <a:solidFill>
+                  <a:srgbClr val="1B5A85"/>
+                </a:solidFill>
+                <a:latin typeface="Saira SemiCondensed Medium" pitchFamily="2" charset="77"/>
+                <a:ea typeface="Noto Sans" panose="020B0502040504020204" pitchFamily="34" charset="0"/>
+                <a:cs typeface="Noto Sans" panose="020B0502040504020204" pitchFamily="34" charset="0"/>
+              </a:rPr>
+              <a:t>Sebastians Part</a:t>
+            </a:r>
+          </a:p>
+        </p:txBody>
+      </p:sp>
+      <p:sp>
+        <p:nvSpPr>
+          <p:cNvPr id="3" name="Rechteck 2">
+            <a:extLst>
+              <a:ext uri="{FF2B5EF4-FFF2-40B4-BE49-F238E27FC236}">
+                <a16:creationId xmlns:a16="http://schemas.microsoft.com/office/drawing/2014/main" id="{B11DB946-CDAD-5C4A-9C7B-955A1597DC82}"/>
+              </a:ext>
+            </a:extLst>
+          </p:cNvPr>
+          <p:cNvSpPr/>
+          <p:nvPr/>
+        </p:nvSpPr>
+        <p:spPr>
+          <a:xfrm>
+            <a:off x="762795" y="2160000"/>
+            <a:ext cx="10666410" cy="2803268"/>
           </a:xfrm>
           <a:prstGeom prst="rect">
             <a:avLst/>
@@ -6551,7 +7230,7 @@
             </a:r>
           </a:p>
           <a:p>
-            <a:pPr marL="800100" lvl="1" indent="-342900">
+            <a:pPr marL="342900" indent="-342900">
               <a:lnSpc>
                 <a:spcPct val="150000"/>
               </a:lnSpc>
@@ -6567,27 +7246,7 @@
                 <a:ea typeface="Noto Sans" panose="020B0502040504020204" pitchFamily="34" charset="0"/>
                 <a:cs typeface="Noto Sans" panose="020B0502040504020204" pitchFamily="34" charset="0"/>
               </a:rPr>
-              <a:t>Navigation, Button, Schnelleditierungsmenü</a:t>
-            </a:r>
-          </a:p>
-          <a:p>
-            <a:pPr marL="342900" indent="-342900">
-              <a:lnSpc>
-                <a:spcPct val="150000"/>
-              </a:lnSpc>
-              <a:buFont typeface="Systemschrift"/>
-              <a:buChar char="+"/>
-            </a:pPr>
-            <a:r>
-              <a:rPr lang="de-DE" sz="2400" dirty="0">
-                <a:solidFill>
-                  <a:srgbClr val="1B5A85"/>
-                </a:solidFill>
-                <a:latin typeface="Noto Sans" panose="020B0502040504020204" pitchFamily="34" charset="0"/>
-                <a:ea typeface="Noto Sans" panose="020B0502040504020204" pitchFamily="34" charset="0"/>
-                <a:cs typeface="Noto Sans" panose="020B0502040504020204" pitchFamily="34" charset="0"/>
-              </a:rPr>
-              <a:t>Diagramme (Klassendiagramm)</a:t>
+              <a:t>Diagramme (Klassendiagramm, …)</a:t>
             </a:r>
           </a:p>
           <a:p>
@@ -6611,68 +7270,6 @@
             </a:r>
           </a:p>
           <a:p>
-            <a:pPr marL="800100" lvl="1" indent="-342900">
-              <a:lnSpc>
-                <a:spcPct val="150000"/>
-              </a:lnSpc>
-              <a:buFont typeface="Systemschrift"/>
-              <a:buChar char="+"/>
-            </a:pPr>
-            <a:r>
-              <a:rPr lang="de-DE" sz="2400" dirty="0">
-                <a:solidFill>
-                  <a:srgbClr val="1B5A85"/>
-                </a:solidFill>
-                <a:latin typeface="Noto Sans" panose="020B0502040504020204" pitchFamily="34" charset="0"/>
-                <a:ea typeface="Noto Sans" panose="020B0502040504020204" pitchFamily="34" charset="0"/>
-                <a:cs typeface="Noto Sans" panose="020B0502040504020204" pitchFamily="34" charset="0"/>
-              </a:rPr>
-              <a:t>Schriftarten, </a:t>
-            </a:r>
-            <a:r>
-              <a:rPr lang="de-DE" sz="2400" dirty="0" err="1">
-                <a:solidFill>
-                  <a:srgbClr val="1B5A85"/>
-                </a:solidFill>
-                <a:latin typeface="Noto Sans" panose="020B0502040504020204" pitchFamily="34" charset="0"/>
-                <a:ea typeface="Noto Sans" panose="020B0502040504020204" pitchFamily="34" charset="0"/>
-                <a:cs typeface="Noto Sans" panose="020B0502040504020204" pitchFamily="34" charset="0"/>
-              </a:rPr>
-              <a:t>Farbtheme</a:t>
-            </a:r>
-            <a:r>
-              <a:rPr lang="de-DE" sz="2400" dirty="0">
-                <a:solidFill>
-                  <a:srgbClr val="1B5A85"/>
-                </a:solidFill>
-                <a:latin typeface="Noto Sans" panose="020B0502040504020204" pitchFamily="34" charset="0"/>
-                <a:ea typeface="Noto Sans" panose="020B0502040504020204" pitchFamily="34" charset="0"/>
-                <a:cs typeface="Noto Sans" panose="020B0502040504020204" pitchFamily="34" charset="0"/>
-              </a:rPr>
-              <a:t> festlegen</a:t>
-            </a:r>
-          </a:p>
-          <a:p>
-            <a:pPr marL="800100" lvl="1" indent="-342900">
-              <a:lnSpc>
-                <a:spcPct val="150000"/>
-              </a:lnSpc>
-              <a:buFont typeface="Systemschrift"/>
-              <a:buChar char="+"/>
-            </a:pPr>
-            <a:r>
-              <a:rPr lang="de-DE" sz="2400" dirty="0">
-                <a:solidFill>
-                  <a:srgbClr val="1B5A85"/>
-                </a:solidFill>
-                <a:latin typeface="Noto Sans" panose="020B0502040504020204" pitchFamily="34" charset="0"/>
-                <a:ea typeface="Noto Sans" panose="020B0502040504020204" pitchFamily="34" charset="0"/>
-                <a:cs typeface="Noto Sans" panose="020B0502040504020204" pitchFamily="34" charset="0"/>
-              </a:rPr>
-              <a:t>Logo und Schriftzug entwerfen und umsetzen</a:t>
-            </a:r>
-          </a:p>
-          <a:p>
             <a:pPr marL="342900" indent="-342900">
               <a:lnSpc>
                 <a:spcPct val="150000"/>
@@ -6712,8 +7309,263 @@
               <a:t>Erstellen der Präsentation</a:t>
             </a:r>
           </a:p>
-          <a:p>
-            <a:pPr marL="800100" lvl="1" indent="-342900">
+        </p:txBody>
+      </p:sp>
+      <p:sp>
+        <p:nvSpPr>
+          <p:cNvPr id="2" name="Foliennummernplatzhalter 1">
+            <a:extLst>
+              <a:ext uri="{FF2B5EF4-FFF2-40B4-BE49-F238E27FC236}">
+                <a16:creationId xmlns:a16="http://schemas.microsoft.com/office/drawing/2014/main" id="{8ACC2FE0-83B0-1349-B0B0-EF5A7186D89F}"/>
+              </a:ext>
+            </a:extLst>
+          </p:cNvPr>
+          <p:cNvSpPr>
+            <a:spLocks noGrp="1"/>
+          </p:cNvSpPr>
+          <p:nvPr>
+            <p:ph type="sldNum" sz="quarter" idx="12"/>
+          </p:nvPr>
+        </p:nvSpPr>
+        <p:spPr>
+          <a:xfrm>
+            <a:off x="8610600" y="6356350"/>
+            <a:ext cx="2743200" cy="365125"/>
+          </a:xfrm>
+        </p:spPr>
+        <p:txBody>
+          <a:bodyPr/>
+          <a:lstStyle/>
+          <a:p>
+            <a:fld id="{12DF98A7-AE68-F146-B173-80A378F4652F}" type="slidenum">
+              <a:rPr lang="de-DE" smtClean="0"/>
+              <a:t>13</a:t>
+            </a:fld>
+            <a:endParaRPr lang="de-DE" dirty="0"/>
+          </a:p>
+        </p:txBody>
+      </p:sp>
+      <p:sp>
+        <p:nvSpPr>
+          <p:cNvPr id="4" name="Datumsplatzhalter 3">
+            <a:extLst>
+              <a:ext uri="{FF2B5EF4-FFF2-40B4-BE49-F238E27FC236}">
+                <a16:creationId xmlns:a16="http://schemas.microsoft.com/office/drawing/2014/main" id="{4499A75F-1A94-CF4F-96D6-3196B06E39CE}"/>
+              </a:ext>
+            </a:extLst>
+          </p:cNvPr>
+          <p:cNvSpPr>
+            <a:spLocks noGrp="1"/>
+          </p:cNvSpPr>
+          <p:nvPr>
+            <p:ph type="dt" sz="half" idx="10"/>
+          </p:nvPr>
+        </p:nvSpPr>
+        <p:spPr/>
+        <p:txBody>
+          <a:bodyPr/>
+          <a:lstStyle/>
+          <a:p>
+            <a:r>
+              <a:rPr lang="de-DE"/>
+              <a:t>01.10.2019</a:t>
+            </a:r>
+          </a:p>
+        </p:txBody>
+      </p:sp>
+    </p:spTree>
+    <p:extLst>
+      <p:ext uri="{BB962C8B-B14F-4D97-AF65-F5344CB8AC3E}">
+        <p14:creationId xmlns:p14="http://schemas.microsoft.com/office/powerpoint/2010/main" val="848050915"/>
+      </p:ext>
+    </p:extLst>
+  </p:cSld>
+  <p:clrMapOvr>
+    <a:masterClrMapping/>
+  </p:clrMapOvr>
+  <p:timing>
+    <p:tnLst>
+      <p:par>
+        <p:cTn id="1" dur="indefinite" restart="never" nodeType="tmRoot">
+          <p:childTnLst>
+            <p:seq concurrent="1" nextAc="seek">
+              <p:cTn id="2" dur="indefinite" nodeType="mainSeq">
+                <p:childTnLst>
+                  <p:par>
+                    <p:cTn id="3" fill="hold">
+                      <p:stCondLst>
+                        <p:cond delay="indefinite"/>
+                      </p:stCondLst>
+                      <p:childTnLst>
+                        <p:par>
+                          <p:cTn id="4" fill="hold">
+                            <p:stCondLst>
+                              <p:cond delay="0"/>
+                            </p:stCondLst>
+                            <p:childTnLst>
+                              <p:par>
+                                <p:cTn id="5" presetID="10" presetClass="entr" presetSubtype="0" fill="hold" grpId="0" nodeType="clickEffect">
+                                  <p:stCondLst>
+                                    <p:cond delay="0"/>
+                                  </p:stCondLst>
+                                  <p:childTnLst>
+                                    <p:set>
+                                      <p:cBhvr>
+                                        <p:cTn id="6" dur="1" fill="hold">
+                                          <p:stCondLst>
+                                            <p:cond delay="0"/>
+                                          </p:stCondLst>
+                                        </p:cTn>
+                                        <p:tgtEl>
+                                          <p:spTgt spid="3"/>
+                                        </p:tgtEl>
+                                        <p:attrNameLst>
+                                          <p:attrName>style.visibility</p:attrName>
+                                        </p:attrNameLst>
+                                      </p:cBhvr>
+                                      <p:to>
+                                        <p:strVal val="visible"/>
+                                      </p:to>
+                                    </p:set>
+                                    <p:animEffect transition="in" filter="fade">
+                                      <p:cBhvr>
+                                        <p:cTn id="7" dur="100"/>
+                                        <p:tgtEl>
+                                          <p:spTgt spid="3"/>
+                                        </p:tgtEl>
+                                      </p:cBhvr>
+                                    </p:animEffect>
+                                  </p:childTnLst>
+                                </p:cTn>
+                              </p:par>
+                            </p:childTnLst>
+                          </p:cTn>
+                        </p:par>
+                      </p:childTnLst>
+                    </p:cTn>
+                  </p:par>
+                </p:childTnLst>
+              </p:cTn>
+              <p:prevCondLst>
+                <p:cond evt="onPrev" delay="0">
+                  <p:tgtEl>
+                    <p:sldTgt/>
+                  </p:tgtEl>
+                </p:cond>
+              </p:prevCondLst>
+              <p:nextCondLst>
+                <p:cond evt="onNext" delay="0">
+                  <p:tgtEl>
+                    <p:sldTgt/>
+                  </p:tgtEl>
+                </p:cond>
+              </p:nextCondLst>
+            </p:seq>
+          </p:childTnLst>
+        </p:cTn>
+      </p:par>
+    </p:tnLst>
+    <p:bldLst>
+      <p:bldP spid="3" grpId="0"/>
+    </p:bldLst>
+  </p:timing>
+</p:sld>
+</file>
+
+<file path=ppt/slides/slide14.xml><?xml version="1.0" encoding="utf-8"?>
+<p:sld xmlns:a="http://schemas.openxmlformats.org/drawingml/2006/main" xmlns:r="http://schemas.openxmlformats.org/officeDocument/2006/relationships" xmlns:p="http://schemas.openxmlformats.org/presentationml/2006/main">
+  <p:cSld>
+    <p:spTree>
+      <p:nvGrpSpPr>
+        <p:cNvPr id="1" name=""/>
+        <p:cNvGrpSpPr/>
+        <p:nvPr/>
+      </p:nvGrpSpPr>
+      <p:grpSpPr>
+        <a:xfrm>
+          <a:off x="0" y="0"/>
+          <a:ext cx="0" cy="0"/>
+          <a:chOff x="0" y="0"/>
+          <a:chExt cx="0" cy="0"/>
+        </a:xfrm>
+      </p:grpSpPr>
+      <p:sp>
+        <p:nvSpPr>
+          <p:cNvPr id="6" name="Rectangle 6"/>
+          <p:cNvSpPr>
+            <a:spLocks noChangeArrowheads="1"/>
+          </p:cNvSpPr>
+          <p:nvPr/>
+        </p:nvSpPr>
+        <p:spPr bwMode="auto">
+          <a:xfrm>
+            <a:off x="1798820" y="278267"/>
+            <a:ext cx="10393180" cy="1566862"/>
+          </a:xfrm>
+          <a:prstGeom prst="rect">
+            <a:avLst/>
+          </a:prstGeom>
+          <a:noFill/>
+          <a:ln w="9525">
+            <a:noFill/>
+            <a:miter lim="800000"/>
+            <a:headEnd/>
+            <a:tailEnd/>
+          </a:ln>
+        </p:spPr>
+        <p:txBody>
+          <a:bodyPr rIns="1080000" anchor="b">
+            <a:noAutofit/>
+          </a:bodyPr>
+          <a:lstStyle/>
+          <a:p>
+            <a:pPr>
+              <a:lnSpc>
+                <a:spcPct val="75000"/>
+              </a:lnSpc>
+            </a:pPr>
+            <a:r>
+              <a:rPr lang="de-DE" sz="4000" spc="-150" dirty="0">
+                <a:solidFill>
+                  <a:srgbClr val="1B5A85"/>
+                </a:solidFill>
+                <a:latin typeface="Saira SemiCondensed Medium" pitchFamily="2" charset="77"/>
+                <a:ea typeface="Noto Sans" panose="020B0502040504020204" pitchFamily="34" charset="0"/>
+                <a:cs typeface="Noto Sans" panose="020B0502040504020204" pitchFamily="34" charset="0"/>
+              </a:rPr>
+              <a:t>Was haben wir gelernt</a:t>
+            </a:r>
+          </a:p>
+        </p:txBody>
+      </p:sp>
+      <p:sp>
+        <p:nvSpPr>
+          <p:cNvPr id="3" name="Rechteck 2">
+            <a:extLst>
+              <a:ext uri="{FF2B5EF4-FFF2-40B4-BE49-F238E27FC236}">
+                <a16:creationId xmlns:a16="http://schemas.microsoft.com/office/drawing/2014/main" id="{B11DB946-CDAD-5C4A-9C7B-955A1597DC82}"/>
+              </a:ext>
+            </a:extLst>
+          </p:cNvPr>
+          <p:cNvSpPr/>
+          <p:nvPr/>
+        </p:nvSpPr>
+        <p:spPr>
+          <a:xfrm>
+            <a:off x="762795" y="2160000"/>
+            <a:ext cx="10666410" cy="2803268"/>
+          </a:xfrm>
+          <a:prstGeom prst="rect">
+            <a:avLst/>
+          </a:prstGeom>
+        </p:spPr>
+        <p:txBody>
+          <a:bodyPr wrap="square">
+            <a:spAutoFit/>
+          </a:bodyPr>
+          <a:lstStyle/>
+          <a:p>
+            <a:pPr marL="342900" indent="-342900">
               <a:lnSpc>
                 <a:spcPct val="150000"/>
               </a:lnSpc>
@@ -6729,11 +7581,11 @@
                 <a:ea typeface="Noto Sans" panose="020B0502040504020204" pitchFamily="34" charset="0"/>
                 <a:cs typeface="Noto Sans" panose="020B0502040504020204" pitchFamily="34" charset="0"/>
               </a:rPr>
-              <a:t>Sprechanteile und Themen festlegen</a:t>
-            </a:r>
-          </a:p>
-          <a:p>
-            <a:pPr marL="800100" lvl="1" indent="-342900">
+              <a:t>Kalender besser studieren</a:t>
+            </a:r>
+          </a:p>
+          <a:p>
+            <a:pPr marL="342900" indent="-342900">
               <a:lnSpc>
                 <a:spcPct val="150000"/>
               </a:lnSpc>
@@ -6749,8 +7601,73 @@
                 <a:ea typeface="Noto Sans" panose="020B0502040504020204" pitchFamily="34" charset="0"/>
                 <a:cs typeface="Noto Sans" panose="020B0502040504020204" pitchFamily="34" charset="0"/>
               </a:rPr>
-              <a:t>Formatierung und Layout</a:t>
-            </a:r>
+              <a:t>E-Mails senden üben</a:t>
+            </a:r>
+          </a:p>
+          <a:p>
+            <a:pPr marL="342900" indent="-342900">
+              <a:lnSpc>
+                <a:spcPct val="150000"/>
+              </a:lnSpc>
+              <a:buFont typeface="Systemschrift"/>
+              <a:buChar char="+"/>
+            </a:pPr>
+            <a:r>
+              <a:rPr lang="de-DE" sz="2400" dirty="0" err="1">
+                <a:solidFill>
+                  <a:srgbClr val="1B5A85"/>
+                </a:solidFill>
+                <a:latin typeface="Noto Sans" panose="020B0502040504020204" pitchFamily="34" charset="0"/>
+                <a:ea typeface="Noto Sans" panose="020B0502040504020204" pitchFamily="34" charset="0"/>
+                <a:cs typeface="Noto Sans" panose="020B0502040504020204" pitchFamily="34" charset="0"/>
+              </a:rPr>
+              <a:t>Zeitmanagment</a:t>
+            </a:r>
+            <a:endParaRPr lang="de-DE" sz="2400" dirty="0">
+              <a:solidFill>
+                <a:srgbClr val="1B5A85"/>
+              </a:solidFill>
+              <a:latin typeface="Noto Sans" panose="020B0502040504020204" pitchFamily="34" charset="0"/>
+              <a:ea typeface="Noto Sans" panose="020B0502040504020204" pitchFamily="34" charset="0"/>
+              <a:cs typeface="Noto Sans" panose="020B0502040504020204" pitchFamily="34" charset="0"/>
+            </a:endParaRPr>
+          </a:p>
+          <a:p>
+            <a:pPr marL="342900" indent="-342900">
+              <a:lnSpc>
+                <a:spcPct val="150000"/>
+              </a:lnSpc>
+              <a:buFont typeface="Systemschrift"/>
+              <a:buChar char="+"/>
+            </a:pPr>
+            <a:r>
+              <a:rPr lang="de-DE" sz="2400">
+                <a:solidFill>
+                  <a:srgbClr val="1B5A85"/>
+                </a:solidFill>
+                <a:latin typeface="Noto Sans" panose="020B0502040504020204" pitchFamily="34" charset="0"/>
+                <a:ea typeface="Noto Sans" panose="020B0502040504020204" pitchFamily="34" charset="0"/>
+                <a:cs typeface="Noto Sans" panose="020B0502040504020204" pitchFamily="34" charset="0"/>
+              </a:rPr>
+              <a:t>Milestones planen</a:t>
+            </a:r>
+          </a:p>
+          <a:p>
+            <a:pPr marL="342900" indent="-342900">
+              <a:lnSpc>
+                <a:spcPct val="150000"/>
+              </a:lnSpc>
+              <a:buFont typeface="Systemschrift"/>
+              <a:buChar char="+"/>
+            </a:pPr>
+            <a:endParaRPr lang="de-DE" sz="2400" dirty="0">
+              <a:solidFill>
+                <a:srgbClr val="1B5A85"/>
+              </a:solidFill>
+              <a:latin typeface="Noto Sans" panose="020B0502040504020204" pitchFamily="34" charset="0"/>
+              <a:ea typeface="Noto Sans" panose="020B0502040504020204" pitchFamily="34" charset="0"/>
+              <a:cs typeface="Noto Sans" panose="020B0502040504020204" pitchFamily="34" charset="0"/>
+            </a:endParaRPr>
           </a:p>
         </p:txBody>
       </p:sp>
@@ -6782,7 +7699,7 @@
           <a:p>
             <a:fld id="{12DF98A7-AE68-F146-B173-80A378F4652F}" type="slidenum">
               <a:rPr lang="de-DE" smtClean="0"/>
-              <a:t>12</a:t>
+              <a:t>14</a:t>
             </a:fld>
             <a:endParaRPr lang="de-DE" dirty="0"/>
           </a:p>
@@ -6819,7 +7736,7 @@
     </p:spTree>
     <p:extLst>
       <p:ext uri="{BB962C8B-B14F-4D97-AF65-F5344CB8AC3E}">
-        <p14:creationId xmlns:p14="http://schemas.microsoft.com/office/powerpoint/2010/main" val="848050915"/>
+        <p14:creationId xmlns:p14="http://schemas.microsoft.com/office/powerpoint/2010/main" val="936285295"/>
       </p:ext>
     </p:extLst>
   </p:cSld>
@@ -6954,14 +7871,13 @@
               </a:ext>
             </a:extLst>
           </a:blip>
-          <a:stretch>
-            <a:fillRect/>
-          </a:stretch>
+          <a:srcRect/>
+          <a:stretch/>
         </p:blipFill>
         <p:spPr>
           <a:xfrm>
             <a:off x="0" y="-536994"/>
-            <a:ext cx="12233066" cy="8189078"/>
+            <a:ext cx="12233066" cy="8189077"/>
           </a:xfrm>
           <a:prstGeom prst="rect">
             <a:avLst/>
@@ -8657,7 +9573,7 @@
         <p:spPr>
           <a:xfrm>
             <a:off x="762795" y="2160000"/>
-            <a:ext cx="10666410" cy="1141274"/>
+            <a:ext cx="10666410" cy="2249270"/>
           </a:xfrm>
           <a:prstGeom prst="rect">
             <a:avLst/>
@@ -8727,8 +9643,67 @@
                 <a:ea typeface="Noto Sans" panose="020B0502040504020204" pitchFamily="34" charset="0"/>
                 <a:cs typeface="Noto Sans" panose="020B0502040504020204" pitchFamily="34" charset="0"/>
               </a:rPr>
-              <a:t>Werkzeug-Organisation für Unternehmen</a:t>
-            </a:r>
+              <a:t>Werkzeug in einem Unternehmen organisieren</a:t>
+            </a:r>
+          </a:p>
+          <a:p>
+            <a:pPr marL="342900" indent="-342900">
+              <a:lnSpc>
+                <a:spcPct val="150000"/>
+              </a:lnSpc>
+              <a:buFont typeface="Systemschrift"/>
+              <a:buChar char="+"/>
+            </a:pPr>
+            <a:r>
+              <a:rPr lang="de-DE" sz="2400" dirty="0">
+                <a:solidFill>
+                  <a:srgbClr val="1B5A85"/>
+                </a:solidFill>
+                <a:latin typeface="Noto Sans" panose="020B0502040504020204" pitchFamily="34" charset="0"/>
+                <a:ea typeface="Noto Sans" panose="020B0502040504020204" pitchFamily="34" charset="0"/>
+                <a:cs typeface="Noto Sans" panose="020B0502040504020204" pitchFamily="34" charset="0"/>
+              </a:rPr>
+              <a:t>Web-App:</a:t>
+            </a:r>
+          </a:p>
+          <a:p>
+            <a:pPr marL="800100" lvl="1" indent="-342900">
+              <a:lnSpc>
+                <a:spcPct val="150000"/>
+              </a:lnSpc>
+              <a:buFont typeface="Systemschrift"/>
+              <a:buChar char="+"/>
+            </a:pPr>
+            <a:r>
+              <a:rPr lang="de-DE" sz="2400" dirty="0">
+                <a:solidFill>
+                  <a:srgbClr val="1B5A85"/>
+                </a:solidFill>
+                <a:latin typeface="Noto Sans" panose="020B0502040504020204" pitchFamily="34" charset="0"/>
+                <a:ea typeface="Noto Sans" panose="020B0502040504020204" pitchFamily="34" charset="0"/>
+                <a:cs typeface="Noto Sans" panose="020B0502040504020204" pitchFamily="34" charset="0"/>
+              </a:rPr>
+              <a:t>Gebaut in </a:t>
+            </a:r>
+            <a:r>
+              <a:rPr lang="de-DE" sz="2400" dirty="0" err="1">
+                <a:solidFill>
+                  <a:srgbClr val="1B5A85"/>
+                </a:solidFill>
+                <a:latin typeface="Noto Sans" panose="020B0502040504020204" pitchFamily="34" charset="0"/>
+                <a:ea typeface="Noto Sans" panose="020B0502040504020204" pitchFamily="34" charset="0"/>
+                <a:cs typeface="Noto Sans" panose="020B0502040504020204" pitchFamily="34" charset="0"/>
+              </a:rPr>
+              <a:t>Laravel</a:t>
+            </a:r>
+            <a:endParaRPr lang="de-DE" sz="2400" dirty="0">
+              <a:solidFill>
+                <a:srgbClr val="1B5A85"/>
+              </a:solidFill>
+              <a:latin typeface="Noto Sans" panose="020B0502040504020204" pitchFamily="34" charset="0"/>
+              <a:ea typeface="Noto Sans" panose="020B0502040504020204" pitchFamily="34" charset="0"/>
+              <a:cs typeface="Noto Sans" panose="020B0502040504020204" pitchFamily="34" charset="0"/>
+            </a:endParaRPr>
           </a:p>
         </p:txBody>
       </p:sp>
@@ -9236,6 +10211,58 @@
               <a:rPr lang="de-DE"/>
               <a:t>01.10.2019</a:t>
             </a:r>
+          </a:p>
+        </p:txBody>
+      </p:sp>
+      <p:sp>
+        <p:nvSpPr>
+          <p:cNvPr id="2" name="Rechteck 1">
+            <a:extLst>
+              <a:ext uri="{FF2B5EF4-FFF2-40B4-BE49-F238E27FC236}">
+                <a16:creationId xmlns:a16="http://schemas.microsoft.com/office/drawing/2014/main" id="{5FE08305-CCD0-D64F-A1B7-1EBC63EDBC96}"/>
+              </a:ext>
+            </a:extLst>
+          </p:cNvPr>
+          <p:cNvSpPr/>
+          <p:nvPr/>
+        </p:nvSpPr>
+        <p:spPr>
+          <a:xfrm>
+            <a:off x="2260600" y="4318000"/>
+            <a:ext cx="1676400" cy="1181100"/>
+          </a:xfrm>
+          <a:prstGeom prst="rect">
+            <a:avLst/>
+          </a:prstGeom>
+          <a:solidFill>
+            <a:srgbClr val="122F48"/>
+          </a:solidFill>
+          <a:ln>
+            <a:noFill/>
+          </a:ln>
+        </p:spPr>
+        <p:style>
+          <a:lnRef idx="2">
+            <a:schemeClr val="accent1">
+              <a:shade val="50000"/>
+            </a:schemeClr>
+          </a:lnRef>
+          <a:fillRef idx="1">
+            <a:schemeClr val="accent1"/>
+          </a:fillRef>
+          <a:effectRef idx="0">
+            <a:schemeClr val="accent1"/>
+          </a:effectRef>
+          <a:fontRef idx="minor">
+            <a:schemeClr val="lt1"/>
+          </a:fontRef>
+        </p:style>
+        <p:txBody>
+          <a:bodyPr rtlCol="0" anchor="ctr"/>
+          <a:lstStyle/>
+          <a:p>
+            <a:pPr algn="ctr"/>
+            <a:endParaRPr lang="de-DE"/>
           </a:p>
         </p:txBody>
       </p:sp>

</xml_diff>